<commit_message>
fixed up dates and language on deck
</commit_message>
<xml_diff>
--- a/Wi19_content/SEDS/L10.Communication.pptx
+++ b/Wi19_content/SEDS/L10.Communication.pptx
@@ -238,7 +238,7 @@
           <a:p>
             <a:fld id="{08F62E20-B1AA-3442-B8F1-F4A56998389D}" type="datetimeFigureOut">
               <a:rPr lang="en-US" smtClean="0"/>
-              <a:t>2/13/18</a:t>
+              <a:t>2/14/19</a:t>
             </a:fld>
             <a:endParaRPr lang="en-US"/>
           </a:p>
@@ -6632,10 +6632,10 @@
                 <a:cs typeface="Calibri"/>
                 <a:sym typeface="Calibri"/>
               </a:rPr>
-              <a:t>We’ll resume as a class and you can ask Jim and I </a:t>
-            </a:r>
-            <a:r>
-              <a:rPr lang="en-US" smtClean="0">
+              <a:t>We’ll resume as a class and you can ask </a:t>
+            </a:r>
+            <a:r>
+              <a:rPr lang="en-US" dirty="0" smtClean="0">
                 <a:solidFill>
                   <a:schemeClr val="dk1"/>
                 </a:solidFill>
@@ -6644,7 +6644,19 @@
                 <a:cs typeface="Calibri"/>
                 <a:sym typeface="Calibri"/>
               </a:rPr>
-              <a:t>for clarifications.</a:t>
+              <a:t>the instructional team </a:t>
+            </a:r>
+            <a:r>
+              <a:rPr lang="en-US" smtClean="0">
+                <a:solidFill>
+                  <a:schemeClr val="dk1"/>
+                </a:solidFill>
+                <a:latin typeface="Calibri"/>
+                <a:ea typeface="Calibri"/>
+                <a:cs typeface="Calibri"/>
+                <a:sym typeface="Calibri"/>
+              </a:rPr>
+              <a:t>for more input</a:t>
             </a:r>
             <a:endParaRPr lang="en-US" dirty="0" smtClean="0">
               <a:solidFill>
@@ -6831,13 +6843,7 @@
               <a:rPr lang="en-US" altLang="en-US" dirty="0" smtClean="0">
                 <a:ea typeface="ＭＳ Ｐゴシック" charset="-128"/>
               </a:rPr>
-              <a:t>Communication </a:t>
-            </a:r>
-            <a:r>
-              <a:rPr lang="en-US" altLang="en-US" dirty="0" smtClean="0">
-                <a:ea typeface="ＭＳ Ｐゴシック" charset="-128"/>
-              </a:rPr>
-              <a:t>around code</a:t>
+              <a:t>Communication around code</a:t>
             </a:r>
           </a:p>
           <a:p>

</xml_diff>